<commit_message>
first commit from hans' lap
</commit_message>
<xml_diff>
--- a/Resources/MA Proposal Reyes v2.pptx
+++ b/Resources/MA Proposal Reyes v2.pptx
@@ -219,7 +219,7 @@
           <p:cNvPr id="2" name="Marcador de encabezado 1">
             <a:extLst>
               <a:ext uri="{FF2B5EF4-FFF2-40B4-BE49-F238E27FC236}">
-                <a16:creationId xmlns:a16="http://schemas.microsoft.com/office/drawing/2014/main" xmlns="" id="{88215532-1488-46F6-842D-C4C4D2D02080}"/>
+                <a16:creationId xmlns:a16="http://schemas.microsoft.com/office/drawing/2014/main" id="{88215532-1488-46F6-842D-C4C4D2D02080}"/>
               </a:ext>
             </a:extLst>
           </p:cNvPr>
@@ -256,7 +256,7 @@
           <p:cNvPr id="3" name="Marcador de fecha 2">
             <a:extLst>
               <a:ext uri="{FF2B5EF4-FFF2-40B4-BE49-F238E27FC236}">
-                <a16:creationId xmlns:a16="http://schemas.microsoft.com/office/drawing/2014/main" xmlns="" id="{A0824291-5A7D-4096-9F4C-2E3FCC576D46}"/>
+                <a16:creationId xmlns:a16="http://schemas.microsoft.com/office/drawing/2014/main" id="{A0824291-5A7D-4096-9F4C-2E3FCC576D46}"/>
               </a:ext>
             </a:extLst>
           </p:cNvPr>
@@ -286,7 +286,7 @@
           <a:p>
             <a:fld id="{1F19113A-7257-4478-9642-A63128F032EC}" type="datetimeFigureOut">
               <a:rPr lang="es-ES" smtClean="0"/>
-              <a:t>14/01/2021</a:t>
+              <a:t>15/01/2021</a:t>
             </a:fld>
             <a:endParaRPr lang="es-ES"/>
           </a:p>
@@ -297,7 +297,7 @@
           <p:cNvPr id="4" name="Marcador de pie de página 3">
             <a:extLst>
               <a:ext uri="{FF2B5EF4-FFF2-40B4-BE49-F238E27FC236}">
-                <a16:creationId xmlns:a16="http://schemas.microsoft.com/office/drawing/2014/main" xmlns="" id="{3A557326-806E-445F-982F-FB2E89AD5CBD}"/>
+                <a16:creationId xmlns:a16="http://schemas.microsoft.com/office/drawing/2014/main" id="{3A557326-806E-445F-982F-FB2E89AD5CBD}"/>
               </a:ext>
             </a:extLst>
           </p:cNvPr>
@@ -334,7 +334,7 @@
           <p:cNvPr id="5" name="Marcador de número de diapositiva 4">
             <a:extLst>
               <a:ext uri="{FF2B5EF4-FFF2-40B4-BE49-F238E27FC236}">
-                <a16:creationId xmlns:a16="http://schemas.microsoft.com/office/drawing/2014/main" xmlns="" id="{FD0112DD-4908-4FD0-B97D-E212E4E5C73B}"/>
+                <a16:creationId xmlns:a16="http://schemas.microsoft.com/office/drawing/2014/main" id="{FD0112DD-4908-4FD0-B97D-E212E4E5C73B}"/>
               </a:ext>
             </a:extLst>
           </p:cNvPr>
@@ -464,7 +464,7 @@
           <a:p>
             <a:fld id="{0D941A8D-0182-49B4-9F66-775413DC9323}" type="datetimeFigureOut">
               <a:rPr lang="es-ES" smtClean="0"/>
-              <a:t>14/01/2021</a:t>
+              <a:t>15/01/2021</a:t>
             </a:fld>
             <a:endParaRPr lang="es-ES"/>
           </a:p>
@@ -958,7 +958,7 @@
           <a:p>
             <a:fld id="{9C382ACD-3E02-499E-AC74-0A3A6DC0D8F5}" type="datetime1">
               <a:rPr lang="en-US" smtClean="0"/>
-              <a:t>1/14/2021</a:t>
+              <a:t>1/15/2021</a:t>
             </a:fld>
             <a:endParaRPr lang="en-US"/>
           </a:p>
@@ -1166,7 +1166,7 @@
           <a:p>
             <a:fld id="{92F415AD-B491-4DAA-AE7E-6FB179581335}" type="datetime1">
               <a:rPr lang="en-US" smtClean="0"/>
-              <a:t>1/14/2021</a:t>
+              <a:t>1/15/2021</a:t>
             </a:fld>
             <a:endParaRPr lang="en-US"/>
           </a:p>
@@ -1422,7 +1422,7 @@
           <a:p>
             <a:fld id="{CD7162C6-B5B2-4A59-B884-E4ACF1CD7B3D}" type="datetime1">
               <a:rPr lang="en-US" smtClean="0"/>
-              <a:t>1/14/2021</a:t>
+              <a:t>1/15/2021</a:t>
             </a:fld>
             <a:endParaRPr lang="en-US"/>
           </a:p>
@@ -1592,7 +1592,7 @@
           <a:p>
             <a:fld id="{1CC7B0A4-03D9-46F8-9964-03C07FAC657C}" type="datetime1">
               <a:rPr lang="en-US" smtClean="0"/>
-              <a:t>1/14/2021</a:t>
+              <a:t>1/15/2021</a:t>
             </a:fld>
             <a:endParaRPr lang="en-US"/>
           </a:p>
@@ -1935,7 +1935,7 @@
           <a:p>
             <a:fld id="{815A886B-C9FB-4D4B-AFA8-A9CA531BC004}" type="datetime1">
               <a:rPr lang="en-US" smtClean="0"/>
-              <a:t>1/14/2021</a:t>
+              <a:t>1/15/2021</a:t>
             </a:fld>
             <a:endParaRPr lang="en-US"/>
           </a:p>
@@ -2210,7 +2210,7 @@
           <a:p>
             <a:fld id="{9522D5C8-F36C-4778-80C2-438CCB99F65F}" type="datetime1">
               <a:rPr lang="en-US" smtClean="0"/>
-              <a:t>1/14/2021</a:t>
+              <a:t>1/15/2021</a:t>
             </a:fld>
             <a:endParaRPr lang="en-US"/>
           </a:p>
@@ -2589,7 +2589,7 @@
           <a:p>
             <a:fld id="{4257B833-928E-49DE-8AB0-10354F4F9C6A}" type="datetime1">
               <a:rPr lang="en-US" smtClean="0"/>
-              <a:t>1/14/2021</a:t>
+              <a:t>1/15/2021</a:t>
             </a:fld>
             <a:endParaRPr lang="en-US"/>
           </a:p>
@@ -2707,7 +2707,7 @@
           <a:p>
             <a:fld id="{30D1DBED-E7F8-4574-B346-2F83C7FF7453}" type="datetime1">
               <a:rPr lang="en-US" smtClean="0"/>
-              <a:t>1/14/2021</a:t>
+              <a:t>1/15/2021</a:t>
             </a:fld>
             <a:endParaRPr lang="en-US"/>
           </a:p>
@@ -2878,7 +2878,7 @@
           <a:p>
             <a:fld id="{5DE2F220-AF2F-465D-8779-E52E45293D35}" type="datetime1">
               <a:rPr lang="en-US" smtClean="0"/>
-              <a:t>1/14/2021</a:t>
+              <a:t>1/15/2021</a:t>
             </a:fld>
             <a:endParaRPr lang="en-US"/>
           </a:p>
@@ -3232,7 +3232,7 @@
           <a:p>
             <a:fld id="{BF695029-AE16-4E75-A986-842439919F7C}" type="datetime1">
               <a:rPr lang="en-US" smtClean="0"/>
-              <a:t>1/14/2021</a:t>
+              <a:t>1/15/2021</a:t>
             </a:fld>
             <a:endParaRPr lang="en-US"/>
           </a:p>
@@ -3609,7 +3609,7 @@
           <a:p>
             <a:fld id="{9D0589BB-7BFD-4873-A7F1-1383331D1DFE}" type="datetime1">
               <a:rPr lang="en-US" smtClean="0"/>
-              <a:t>1/14/2021</a:t>
+              <a:t>1/15/2021</a:t>
             </a:fld>
             <a:endParaRPr lang="en-US"/>
           </a:p>
@@ -3896,7 +3896,7 @@
           <a:p>
             <a:fld id="{11843F84-06EA-471C-9D14-974FF349CC55}" type="datetime1">
               <a:rPr lang="en-US" smtClean="0"/>
-              <a:t>1/14/2021</a:t>
+              <a:t>1/15/2021</a:t>
             </a:fld>
             <a:endParaRPr lang="en-US"/>
           </a:p>
@@ -4489,13 +4489,6 @@
   <p:clrMapOvr>
     <a:masterClrMapping/>
   </p:clrMapOvr>
-  <p:timing>
-    <p:tnLst>
-      <p:par>
-        <p:cTn id="1" dur="indefinite" restart="never" nodeType="tmRoot"/>
-      </p:par>
-    </p:tnLst>
-  </p:timing>
 </p:sld>
 </file>
 
@@ -4592,7 +4585,7 @@
           <p:cNvPr id="4" name="Marcador de número de diapositiva 3">
             <a:extLst>
               <a:ext uri="{FF2B5EF4-FFF2-40B4-BE49-F238E27FC236}">
-                <a16:creationId xmlns:a16="http://schemas.microsoft.com/office/drawing/2014/main" xmlns="" id="{ABA972E5-496F-45A1-9DA4-F74A4A5B2D43}"/>
+                <a16:creationId xmlns:a16="http://schemas.microsoft.com/office/drawing/2014/main" id="{ABA972E5-496F-45A1-9DA4-F74A4A5B2D43}"/>
               </a:ext>
             </a:extLst>
           </p:cNvPr>
@@ -4626,13 +4619,6 @@
   <p:clrMapOvr>
     <a:masterClrMapping/>
   </p:clrMapOvr>
-  <p:timing>
-    <p:tnLst>
-      <p:par>
-        <p:cTn id="1" dur="indefinite" restart="never" nodeType="tmRoot"/>
-      </p:par>
-    </p:tnLst>
-  </p:timing>
 </p:sld>
 </file>
 
@@ -4777,7 +4763,7 @@
           <p:cNvPr id="4" name="Marcador de número de diapositiva 3">
             <a:extLst>
               <a:ext uri="{FF2B5EF4-FFF2-40B4-BE49-F238E27FC236}">
-                <a16:creationId xmlns:a16="http://schemas.microsoft.com/office/drawing/2014/main" xmlns="" id="{730CB2DD-E9B3-453B-B9EA-9FA87388614B}"/>
+                <a16:creationId xmlns:a16="http://schemas.microsoft.com/office/drawing/2014/main" id="{730CB2DD-E9B3-453B-B9EA-9FA87388614B}"/>
               </a:ext>
             </a:extLst>
           </p:cNvPr>
@@ -4811,13 +4797,6 @@
   <p:clrMapOvr>
     <a:masterClrMapping/>
   </p:clrMapOvr>
-  <p:timing>
-    <p:tnLst>
-      <p:par>
-        <p:cTn id="1" dur="indefinite" restart="never" nodeType="tmRoot"/>
-      </p:par>
-    </p:tnLst>
-  </p:timing>
 </p:sld>
 </file>
 
@@ -4889,13 +4868,6 @@
   <p:clrMapOvr>
     <a:masterClrMapping/>
   </p:clrMapOvr>
-  <p:timing>
-    <p:tnLst>
-      <p:par>
-        <p:cTn id="1" dur="indefinite" restart="never" nodeType="tmRoot"/>
-      </p:par>
-    </p:tnLst>
-  </p:timing>
 </p:sld>
 </file>
 
@@ -4998,28 +4970,27 @@
           </a:p>
           <a:p>
             <a:r>
-              <a:rPr lang="en-US" dirty="0" smtClean="0"/>
+              <a:rPr lang="en-US" dirty="0"/>
               <a:t>FANN is a free open source neural network library that implements multi-layer ANNs in C. These can be ported and optimized in ARM Cortex-M architectures.</a:t>
             </a:r>
           </a:p>
           <a:p>
             <a:r>
-              <a:rPr lang="en-US" dirty="0" smtClean="0"/>
+              <a:rPr lang="en-US" dirty="0"/>
               <a:t>Tested with a 6-input, 3-class perceptron with 2 hidden layers and evaluation of a network with 1000 nodes and 47900 weights (256kB).</a:t>
             </a:r>
           </a:p>
           <a:p>
             <a:r>
-              <a:rPr lang="en-US" dirty="0" smtClean="0"/>
+              <a:rPr lang="en-US" dirty="0"/>
               <a:t>Presented process flow: create/obtain dataset, preprocessing, define/train NN, deploy on device.</a:t>
             </a:r>
           </a:p>
           <a:p>
             <a:r>
-              <a:rPr lang="en-US" dirty="0" smtClean="0"/>
+              <a:rPr lang="en-US" dirty="0"/>
               <a:t>(Still analyzing) </a:t>
             </a:r>
-            <a:endParaRPr lang="en-US" dirty="0" smtClean="0"/>
           </a:p>
           <a:p>
             <a:endParaRPr lang="en-US" dirty="0"/>
@@ -5031,7 +5002,7 @@
           <p:cNvPr id="4" name="Marcador de número de diapositiva 3">
             <a:extLst>
               <a:ext uri="{FF2B5EF4-FFF2-40B4-BE49-F238E27FC236}">
-                <a16:creationId xmlns:a16="http://schemas.microsoft.com/office/drawing/2014/main" xmlns="" id="{3BA7A817-E41B-4992-961F-16A071A19ACE}"/>
+                <a16:creationId xmlns:a16="http://schemas.microsoft.com/office/drawing/2014/main" id="{3BA7A817-E41B-4992-961F-16A071A19ACE}"/>
               </a:ext>
             </a:extLst>
           </p:cNvPr>
@@ -5065,13 +5036,6 @@
   <p:clrMapOvr>
     <a:masterClrMapping/>
   </p:clrMapOvr>
-  <p:timing>
-    <p:tnLst>
-      <p:par>
-        <p:cTn id="1" dur="indefinite" restart="never" nodeType="tmRoot"/>
-      </p:par>
-    </p:tnLst>
-  </p:timing>
 </p:sld>
 </file>
 
@@ -5183,12 +5147,8 @@
           <a:lstStyle/>
           <a:p>
             <a:r>
-              <a:rPr lang="en-US" dirty="0" smtClean="0"/>
-              <a:t>Process flow according to [1</a:t>
-            </a:r>
-            <a:r>
               <a:rPr lang="en-US" dirty="0"/>
-              <a:t>]</a:t>
+              <a:t>Process flow according to [1]</a:t>
             </a:r>
           </a:p>
         </p:txBody>
@@ -5203,13 +5163,6 @@
   <p:clrMapOvr>
     <a:masterClrMapping/>
   </p:clrMapOvr>
-  <p:timing>
-    <p:tnLst>
-      <p:par>
-        <p:cTn id="1" dur="indefinite" restart="never" nodeType="tmRoot"/>
-      </p:par>
-    </p:tnLst>
-  </p:timing>
 </p:sld>
 </file>
 
@@ -5246,10 +5199,9 @@
           <a:lstStyle/>
           <a:p>
             <a:r>
-              <a:rPr lang="en-US" dirty="0" smtClean="0"/>
+              <a:rPr lang="en-US" dirty="0"/>
               <a:t>Proposal 1: details</a:t>
             </a:r>
-            <a:endParaRPr lang="en-US" dirty="0"/>
           </a:p>
         </p:txBody>
       </p:sp>
@@ -5269,35 +5221,31 @@
           <a:lstStyle/>
           <a:p>
             <a:r>
-              <a:rPr lang="en-US" i="1" dirty="0" smtClean="0"/>
+              <a:rPr lang="en-US" i="1" dirty="0"/>
               <a:t>Implementation of an ANN using </a:t>
             </a:r>
             <a:r>
-              <a:rPr lang="en-US" i="1" dirty="0" err="1" smtClean="0"/>
+              <a:rPr lang="en-US" i="1" dirty="0" err="1"/>
               <a:t>FANNCortexM</a:t>
             </a:r>
             <a:r>
-              <a:rPr lang="en-US" i="1" dirty="0" smtClean="0"/>
+              <a:rPr lang="en-US" i="1" dirty="0"/>
               <a:t> on a Axis Communication Hub to evaluate its performance and usage reliability within an </a:t>
             </a:r>
             <a:r>
-              <a:rPr lang="en-US" i="1" dirty="0" err="1" smtClean="0"/>
+              <a:rPr lang="en-US" i="1" dirty="0" err="1"/>
               <a:t>EtherCAT</a:t>
             </a:r>
             <a:r>
-              <a:rPr lang="en-US" i="1" dirty="0" smtClean="0"/>
+              <a:rPr lang="en-US" i="1" dirty="0"/>
               <a:t> Network.</a:t>
             </a:r>
           </a:p>
           <a:p>
             <a:pPr lvl="1"/>
             <a:r>
-              <a:rPr lang="en-US" dirty="0" smtClean="0"/>
-              <a:t>Use </a:t>
-            </a:r>
-            <a:r>
               <a:rPr lang="en-US" dirty="0"/>
-              <a:t>a pre-trained NN with multi-layer </a:t>
+              <a:t>Use a pre-trained NN with multi-layer </a:t>
             </a:r>
             <a:r>
               <a:rPr lang="en-US" dirty="0" err="1"/>
@@ -5311,28 +5259,8 @@
           <a:p>
             <a:pPr lvl="1"/>
             <a:r>
-              <a:rPr lang="en-US" dirty="0" smtClean="0"/>
-              <a:t>According to [1], it will be focused </a:t>
-            </a:r>
-            <a:r>
               <a:rPr lang="en-US" dirty="0"/>
-              <a:t>on define/train NN, deploy on device stages, </a:t>
-            </a:r>
-            <a:r>
-              <a:rPr lang="en-US" dirty="0" smtClean="0"/>
-              <a:t>using a </a:t>
-            </a:r>
-            <a:r>
-              <a:rPr lang="en-US" dirty="0"/>
-              <a:t>given data set </a:t>
-            </a:r>
-            <a:r>
-              <a:rPr lang="en-US" dirty="0" smtClean="0"/>
-              <a:t>at an specific </a:t>
-            </a:r>
-            <a:r>
-              <a:rPr lang="en-US" dirty="0"/>
-              <a:t>accuracy.</a:t>
+              <a:t>According to [1], it will be focused on define/train NN, deploy on device stages, using a given data set at an specific accuracy.</a:t>
             </a:r>
           </a:p>
           <a:p>
@@ -5347,11 +5275,7 @@
             </a:r>
             <a:r>
               <a:rPr lang="en-US" dirty="0"/>
-              <a:t>, identification of best network, FPU configuration, implementation to HW, measure performance and power</a:t>
-            </a:r>
-            <a:r>
-              <a:rPr lang="en-US" dirty="0" smtClean="0"/>
-              <a:t>.</a:t>
+              <a:t>, identification of best network, FPU configuration, implementation to HW, measure performance and power.</a:t>
             </a:r>
           </a:p>
           <a:p>
@@ -5362,23 +5286,7 @@
             <a:pPr lvl="1"/>
             <a:r>
               <a:rPr lang="en-US" dirty="0"/>
-              <a:t>Current Axis Communication Hub integrates a STM32F446RTE MCU with ARM Cortex-M4 architecture, has FPU and it is within the high performance family </a:t>
-            </a:r>
-            <a:r>
-              <a:rPr lang="en-US" dirty="0" smtClean="0"/>
-              <a:t>ST processors. </a:t>
-            </a:r>
-            <a:r>
-              <a:rPr lang="en-US" dirty="0"/>
-              <a:t>512kB Flash/128+4KB </a:t>
-            </a:r>
-            <a:r>
-              <a:rPr lang="en-US" dirty="0" smtClean="0"/>
-              <a:t>RAM[2].</a:t>
-            </a:r>
-            <a:r>
-              <a:rPr lang="en-US" dirty="0"/>
-              <a:t/>
+              <a:t>Current Axis Communication Hub integrates a STM32F446RTE MCU with ARM Cortex-M4 architecture, has FPU and it is within the high performance family ST processors. 512kB Flash/128+4KB RAM[2].</a:t>
             </a:r>
             <a:br>
               <a:rPr lang="en-US" dirty="0"/>
@@ -5423,13 +5331,6 @@
   <p:clrMapOvr>
     <a:masterClrMapping/>
   </p:clrMapOvr>
-  <p:timing>
-    <p:tnLst>
-      <p:par>
-        <p:cTn id="1" dur="indefinite" restart="never" nodeType="tmRoot"/>
-      </p:par>
-    </p:tnLst>
-  </p:timing>
 </p:sld>
 </file>
 
@@ -5466,10 +5367,9 @@
           <a:lstStyle/>
           <a:p>
             <a:r>
-              <a:rPr lang="en-US" dirty="0" smtClean="0"/>
+              <a:rPr lang="en-US" dirty="0"/>
               <a:t>Notes from Papers</a:t>
             </a:r>
-            <a:endParaRPr lang="en-US" dirty="0"/>
           </a:p>
         </p:txBody>
       </p:sp>
@@ -5489,7 +5389,7 @@
           <a:lstStyle/>
           <a:p>
             <a:r>
-              <a:rPr lang="en-US" dirty="0" smtClean="0"/>
+              <a:rPr lang="en-US" dirty="0"/>
               <a:t>Neural Network Kernel functions structure</a:t>
             </a:r>
           </a:p>
@@ -5580,7 +5480,7 @@
           <p:cNvPr id="2" name="Título 1">
             <a:extLst>
               <a:ext uri="{FF2B5EF4-FFF2-40B4-BE49-F238E27FC236}">
-                <a16:creationId xmlns:a16="http://schemas.microsoft.com/office/drawing/2014/main" xmlns="" id="{C7ECAC02-D639-40CE-9437-40D843CDFA80}"/>
+                <a16:creationId xmlns:a16="http://schemas.microsoft.com/office/drawing/2014/main" id="{C7ECAC02-D639-40CE-9437-40D843CDFA80}"/>
               </a:ext>
             </a:extLst>
           </p:cNvPr>
@@ -5609,7 +5509,7 @@
           <p:cNvPr id="3" name="Marcador de contenido 2">
             <a:extLst>
               <a:ext uri="{FF2B5EF4-FFF2-40B4-BE49-F238E27FC236}">
-                <a16:creationId xmlns:a16="http://schemas.microsoft.com/office/drawing/2014/main" xmlns="" id="{8FAD0474-35F0-4ED7-8A9B-CA0451ACF7BD}"/>
+                <a16:creationId xmlns:a16="http://schemas.microsoft.com/office/drawing/2014/main" id="{8FAD0474-35F0-4ED7-8A9B-CA0451ACF7BD}"/>
               </a:ext>
             </a:extLst>
           </p:cNvPr>
@@ -5827,11 +5727,7 @@
             </a:r>
             <a:r>
               <a:rPr lang="es-ES" dirty="0"/>
-              <a:t>: 10.1109/WF-IoT.2019.8767290</a:t>
-            </a:r>
-            <a:r>
-              <a:rPr lang="es-ES" dirty="0" smtClean="0"/>
-              <a:t>.</a:t>
+              <a:t>: 10.1109/WF-IoT.2019.8767290.</a:t>
             </a:r>
           </a:p>
           <a:p>
@@ -5839,130 +5735,113 @@
           </a:p>
           <a:p>
             <a:r>
-              <a:rPr lang="es-ES" dirty="0" smtClean="0"/>
+              <a:rPr lang="es-ES" dirty="0"/>
               <a:t>[2]	J. C. Reyes, “</a:t>
             </a:r>
             <a:r>
               <a:rPr lang="en-US" dirty="0"/>
-              <a:t>Development of an </a:t>
-            </a:r>
-            <a:r>
-              <a:rPr lang="en-US" dirty="0" smtClean="0"/>
-              <a:t>embedded communication </a:t>
-            </a:r>
-            <a:r>
-              <a:rPr lang="en-US" dirty="0"/>
-              <a:t>hub for sensor </a:t>
-            </a:r>
-            <a:r>
-              <a:rPr lang="en-US" dirty="0" smtClean="0"/>
-              <a:t>data acquisition </a:t>
-            </a:r>
-            <a:r>
-              <a:rPr lang="en-US" dirty="0"/>
-              <a:t>in a robotic system</a:t>
-            </a:r>
-            <a:r>
-              <a:rPr lang="es-ES" dirty="0" smtClean="0"/>
+              <a:t>Development of an embedded communication hub for sensor data acquisition in a robotic system</a:t>
+            </a:r>
+            <a:r>
+              <a:rPr lang="es-ES" dirty="0"/>
               <a:t>”, </a:t>
             </a:r>
             <a:r>
-              <a:rPr lang="es-ES" dirty="0" err="1" smtClean="0"/>
+              <a:rPr lang="es-ES" dirty="0" err="1"/>
               <a:t>September</a:t>
             </a:r>
             <a:r>
-              <a:rPr lang="es-ES" dirty="0" smtClean="0"/>
+              <a:rPr lang="es-ES" dirty="0"/>
               <a:t> 2020, </a:t>
             </a:r>
             <a:r>
-              <a:rPr lang="es-ES" dirty="0" err="1" smtClean="0"/>
+              <a:rPr lang="es-ES" dirty="0" err="1"/>
               <a:t>Research</a:t>
             </a:r>
             <a:r>
-              <a:rPr lang="es-ES" dirty="0" smtClean="0"/>
+              <a:rPr lang="es-ES" dirty="0"/>
               <a:t> Project </a:t>
             </a:r>
             <a:r>
-              <a:rPr lang="es-ES" dirty="0" err="1" smtClean="0"/>
+              <a:rPr lang="es-ES" dirty="0" err="1"/>
               <a:t>supervised</a:t>
             </a:r>
             <a:r>
-              <a:rPr lang="es-ES" dirty="0" smtClean="0"/>
+              <a:rPr lang="es-ES" dirty="0"/>
               <a:t> </a:t>
             </a:r>
             <a:r>
-              <a:rPr lang="es-ES" dirty="0" err="1" smtClean="0"/>
+              <a:rPr lang="es-ES" dirty="0" err="1"/>
               <a:t>by</a:t>
             </a:r>
             <a:r>
-              <a:rPr lang="es-ES" dirty="0" smtClean="0"/>
+              <a:rPr lang="es-ES" dirty="0"/>
               <a:t> </a:t>
             </a:r>
             <a:r>
-              <a:rPr lang="es-ES" dirty="0" err="1" smtClean="0"/>
+              <a:rPr lang="es-ES" dirty="0" err="1"/>
               <a:t>the</a:t>
             </a:r>
             <a:r>
-              <a:rPr lang="es-ES" dirty="0" smtClean="0"/>
+              <a:rPr lang="es-ES" dirty="0"/>
               <a:t> </a:t>
             </a:r>
             <a:r>
-              <a:rPr lang="es-ES" dirty="0" err="1" smtClean="0"/>
+              <a:rPr lang="es-ES" dirty="0" err="1"/>
               <a:t>Research</a:t>
             </a:r>
             <a:r>
-              <a:rPr lang="es-ES" dirty="0" smtClean="0"/>
+              <a:rPr lang="es-ES" dirty="0"/>
               <a:t> </a:t>
             </a:r>
             <a:r>
-              <a:rPr lang="es-ES" dirty="0" err="1" smtClean="0"/>
+              <a:rPr lang="es-ES" dirty="0" err="1"/>
               <a:t>Group</a:t>
             </a:r>
             <a:r>
-              <a:rPr lang="es-ES" dirty="0" smtClean="0"/>
+              <a:rPr lang="es-ES" dirty="0"/>
               <a:t> </a:t>
             </a:r>
             <a:r>
-              <a:rPr lang="es-ES" dirty="0" err="1" smtClean="0"/>
+              <a:rPr lang="es-ES" dirty="0" err="1"/>
               <a:t>smartPORT</a:t>
             </a:r>
             <a:r>
-              <a:rPr lang="es-ES" dirty="0" smtClean="0"/>
+              <a:rPr lang="es-ES" dirty="0"/>
               <a:t> of </a:t>
             </a:r>
             <a:r>
-              <a:rPr lang="es-ES" dirty="0" err="1" smtClean="0"/>
+              <a:rPr lang="es-ES" dirty="0" err="1"/>
               <a:t>the</a:t>
             </a:r>
             <a:r>
-              <a:rPr lang="es-ES" dirty="0" smtClean="0"/>
+              <a:rPr lang="es-ES" dirty="0"/>
               <a:t> </a:t>
             </a:r>
             <a:r>
-              <a:rPr lang="es-ES" dirty="0" err="1" smtClean="0"/>
+              <a:rPr lang="es-ES" dirty="0" err="1"/>
               <a:t>Hamburg</a:t>
             </a:r>
             <a:r>
-              <a:rPr lang="es-ES" dirty="0" smtClean="0"/>
+              <a:rPr lang="es-ES" dirty="0"/>
               <a:t> </a:t>
             </a:r>
             <a:r>
-              <a:rPr lang="es-ES" dirty="0" err="1" smtClean="0"/>
+              <a:rPr lang="es-ES" dirty="0" err="1"/>
               <a:t>University</a:t>
             </a:r>
             <a:r>
-              <a:rPr lang="es-ES" dirty="0" smtClean="0"/>
+              <a:rPr lang="es-ES" dirty="0"/>
               <a:t> of </a:t>
             </a:r>
             <a:r>
-              <a:rPr lang="es-ES" dirty="0" err="1" smtClean="0"/>
+              <a:rPr lang="es-ES" dirty="0" err="1"/>
               <a:t>Hamburg</a:t>
             </a:r>
             <a:r>
-              <a:rPr lang="es-ES" dirty="0" smtClean="0"/>
+              <a:rPr lang="es-ES" dirty="0"/>
               <a:t> (TUHH)</a:t>
             </a:r>
-            <a:endParaRPr lang="es-ES" dirty="0"/>
           </a:p>
         </p:txBody>
       </p:sp>
@@ -5971,7 +5850,7 @@
           <p:cNvPr id="4" name="Marcador de número de diapositiva 3">
             <a:extLst>
               <a:ext uri="{FF2B5EF4-FFF2-40B4-BE49-F238E27FC236}">
-                <a16:creationId xmlns:a16="http://schemas.microsoft.com/office/drawing/2014/main" xmlns="" id="{5D554E22-3AF3-4D05-B4FD-A3B59C806140}"/>
+                <a16:creationId xmlns:a16="http://schemas.microsoft.com/office/drawing/2014/main" id="{5D554E22-3AF3-4D05-B4FD-A3B59C806140}"/>
               </a:ext>
             </a:extLst>
           </p:cNvPr>
@@ -6005,13 +5884,6 @@
   <p:clrMapOvr>
     <a:masterClrMapping/>
   </p:clrMapOvr>
-  <p:timing>
-    <p:tnLst>
-      <p:par>
-        <p:cTn id="1" dur="indefinite" restart="never" nodeType="tmRoot"/>
-      </p:par>
-    </p:tnLst>
-  </p:timing>
 </p:sld>
 </file>
 
@@ -6053,10 +5925,9 @@
           <a:lstStyle/>
           <a:p>
             <a:r>
-              <a:rPr lang="en-US" dirty="0" smtClean="0"/>
+              <a:rPr lang="en-US" dirty="0"/>
               <a:t>ST Portfolio</a:t>
             </a:r>
-            <a:endParaRPr lang="en-US" dirty="0"/>
           </a:p>
         </p:txBody>
       </p:sp>
@@ -6332,7 +6203,7 @@
           <p:cNvPr id="4" name="Marcador de número de diapositiva 3">
             <a:extLst>
               <a:ext uri="{FF2B5EF4-FFF2-40B4-BE49-F238E27FC236}">
-                <a16:creationId xmlns:a16="http://schemas.microsoft.com/office/drawing/2014/main" xmlns="" id="{85D35542-7FFB-41F8-8078-58478FB5B0E7}"/>
+                <a16:creationId xmlns:a16="http://schemas.microsoft.com/office/drawing/2014/main" id="{85D35542-7FFB-41F8-8078-58478FB5B0E7}"/>
               </a:ext>
             </a:extLst>
           </p:cNvPr>
@@ -6366,13 +6237,6 @@
   <p:clrMapOvr>
     <a:masterClrMapping/>
   </p:clrMapOvr>
-  <p:timing>
-    <p:tnLst>
-      <p:par>
-        <p:cTn id="1" dur="indefinite" restart="never" nodeType="tmRoot"/>
-      </p:par>
-    </p:tnLst>
-  </p:timing>
 </p:sld>
 </file>
 
@@ -6417,7 +6281,7 @@
           <a:p>
             <a:r>
               <a:rPr lang="en-US" sz="4000" dirty="0"/>
-              <a:t>Structure with new feature</a:t>
+              <a:t>Current structure with new feature</a:t>
             </a:r>
           </a:p>
         </p:txBody>
@@ -6471,8 +6335,8 @@
         </p:blipFill>
         <p:spPr>
           <a:xfrm>
-            <a:off x="1784135" y="2430162"/>
-            <a:ext cx="8524875" cy="3920954"/>
+            <a:off x="1784135" y="2450292"/>
+            <a:ext cx="8116323" cy="3733043"/>
           </a:xfrm>
           <a:prstGeom prst="rect">
             <a:avLst/>
@@ -6484,7 +6348,7 @@
           <p:cNvPr id="4" name="Marcador de número de diapositiva 3">
             <a:extLst>
               <a:ext uri="{FF2B5EF4-FFF2-40B4-BE49-F238E27FC236}">
-                <a16:creationId xmlns:a16="http://schemas.microsoft.com/office/drawing/2014/main" xmlns="" id="{ED18DD80-1CF5-4220-B035-4E9907A39F39}"/>
+                <a16:creationId xmlns:a16="http://schemas.microsoft.com/office/drawing/2014/main" id="{ED18DD80-1CF5-4220-B035-4E9907A39F39}"/>
               </a:ext>
             </a:extLst>
           </p:cNvPr>
@@ -6518,13 +6382,6 @@
   <p:clrMapOvr>
     <a:masterClrMapping/>
   </p:clrMapOvr>
-  <p:timing>
-    <p:tnLst>
-      <p:par>
-        <p:cTn id="1" dur="indefinite" restart="never" nodeType="tmRoot"/>
-      </p:par>
-    </p:tnLst>
-  </p:timing>
 </p:sld>
 </file>
 
@@ -6636,7 +6493,7 @@
           <p:cNvPr id="5" name="Marcador de número de diapositiva 4">
             <a:extLst>
               <a:ext uri="{FF2B5EF4-FFF2-40B4-BE49-F238E27FC236}">
-                <a16:creationId xmlns:a16="http://schemas.microsoft.com/office/drawing/2014/main" xmlns="" id="{55FFE96D-FC0D-46BF-B0B5-0CB47A0B1692}"/>
+                <a16:creationId xmlns:a16="http://schemas.microsoft.com/office/drawing/2014/main" id="{55FFE96D-FC0D-46BF-B0B5-0CB47A0B1692}"/>
               </a:ext>
             </a:extLst>
           </p:cNvPr>
@@ -6670,13 +6527,6 @@
   <p:clrMapOvr>
     <a:masterClrMapping/>
   </p:clrMapOvr>
-  <p:timing>
-    <p:tnLst>
-      <p:par>
-        <p:cTn id="1" dur="indefinite" restart="never" nodeType="tmRoot"/>
-      </p:par>
-    </p:tnLst>
-  </p:timing>
 </p:sld>
 </file>
 
@@ -6794,7 +6644,7 @@
           <p:cNvPr id="5" name="Marcador de número de diapositiva 4">
             <a:extLst>
               <a:ext uri="{FF2B5EF4-FFF2-40B4-BE49-F238E27FC236}">
-                <a16:creationId xmlns:a16="http://schemas.microsoft.com/office/drawing/2014/main" xmlns="" id="{6E673070-E3E5-417E-8A9B-074E2F66D0BF}"/>
+                <a16:creationId xmlns:a16="http://schemas.microsoft.com/office/drawing/2014/main" id="{6E673070-E3E5-417E-8A9B-074E2F66D0BF}"/>
               </a:ext>
             </a:extLst>
           </p:cNvPr>
@@ -6828,13 +6678,6 @@
   <p:clrMapOvr>
     <a:masterClrMapping/>
   </p:clrMapOvr>
-  <p:timing>
-    <p:tnLst>
-      <p:par>
-        <p:cTn id="1" dur="indefinite" restart="never" nodeType="tmRoot"/>
-      </p:par>
-    </p:tnLst>
-  </p:timing>
 </p:sld>
 </file>
 
@@ -6946,7 +6789,7 @@
           <p:cNvPr id="5" name="Marcador de número de diapositiva 4">
             <a:extLst>
               <a:ext uri="{FF2B5EF4-FFF2-40B4-BE49-F238E27FC236}">
-                <a16:creationId xmlns:a16="http://schemas.microsoft.com/office/drawing/2014/main" xmlns="" id="{B3BB892B-B07B-472E-8262-CC271077FCBC}"/>
+                <a16:creationId xmlns:a16="http://schemas.microsoft.com/office/drawing/2014/main" id="{B3BB892B-B07B-472E-8262-CC271077FCBC}"/>
               </a:ext>
             </a:extLst>
           </p:cNvPr>
@@ -6980,13 +6823,6 @@
   <p:clrMapOvr>
     <a:masterClrMapping/>
   </p:clrMapOvr>
-  <p:timing>
-    <p:tnLst>
-      <p:par>
-        <p:cTn id="1" dur="indefinite" restart="never" nodeType="tmRoot"/>
-      </p:par>
-    </p:tnLst>
-  </p:timing>
 </p:sld>
 </file>
 
@@ -7101,7 +6937,7 @@
           <p:cNvPr id="4" name="Marcador de número de diapositiva 3">
             <a:extLst>
               <a:ext uri="{FF2B5EF4-FFF2-40B4-BE49-F238E27FC236}">
-                <a16:creationId xmlns:a16="http://schemas.microsoft.com/office/drawing/2014/main" xmlns="" id="{39D6CC18-A8FC-4E18-BBC1-1B6A4188549D}"/>
+                <a16:creationId xmlns:a16="http://schemas.microsoft.com/office/drawing/2014/main" id="{39D6CC18-A8FC-4E18-BBC1-1B6A4188549D}"/>
               </a:ext>
             </a:extLst>
           </p:cNvPr>
@@ -7135,13 +6971,6 @@
   <p:clrMapOvr>
     <a:masterClrMapping/>
   </p:clrMapOvr>
-  <p:timing>
-    <p:tnLst>
-      <p:par>
-        <p:cTn id="1" dur="indefinite" restart="never" nodeType="tmRoot"/>
-      </p:par>
-    </p:tnLst>
-  </p:timing>
 </p:sld>
 </file>
 
@@ -7232,7 +7061,7 @@
           <p:cNvPr id="5" name="Marcador de número de diapositiva 4">
             <a:extLst>
               <a:ext uri="{FF2B5EF4-FFF2-40B4-BE49-F238E27FC236}">
-                <a16:creationId xmlns:a16="http://schemas.microsoft.com/office/drawing/2014/main" xmlns="" id="{FF106959-8427-4E5A-AFE4-DC0E237EFE19}"/>
+                <a16:creationId xmlns:a16="http://schemas.microsoft.com/office/drawing/2014/main" id="{FF106959-8427-4E5A-AFE4-DC0E237EFE19}"/>
               </a:ext>
             </a:extLst>
           </p:cNvPr>
@@ -7266,13 +7095,6 @@
   <p:clrMapOvr>
     <a:masterClrMapping/>
   </p:clrMapOvr>
-  <p:timing>
-    <p:tnLst>
-      <p:par>
-        <p:cTn id="1" dur="indefinite" restart="never" nodeType="tmRoot"/>
-      </p:par>
-    </p:tnLst>
-  </p:timing>
 </p:sld>
 </file>
 
@@ -7388,7 +7210,7 @@
           <p:cNvPr id="4" name="Marcador de número de diapositiva 3">
             <a:extLst>
               <a:ext uri="{FF2B5EF4-FFF2-40B4-BE49-F238E27FC236}">
-                <a16:creationId xmlns:a16="http://schemas.microsoft.com/office/drawing/2014/main" xmlns="" id="{5C72A529-F375-4D3A-A795-5A549E75DAF7}"/>
+                <a16:creationId xmlns:a16="http://schemas.microsoft.com/office/drawing/2014/main" id="{5C72A529-F375-4D3A-A795-5A549E75DAF7}"/>
               </a:ext>
             </a:extLst>
           </p:cNvPr>
@@ -7422,13 +7244,6 @@
   <p:clrMapOvr>
     <a:masterClrMapping/>
   </p:clrMapOvr>
-  <p:timing>
-    <p:tnLst>
-      <p:par>
-        <p:cTn id="1" dur="indefinite" restart="never" nodeType="tmRoot"/>
-      </p:par>
-    </p:tnLst>
-  </p:timing>
 </p:sld>
 </file>
 

</xml_diff>

<commit_message>
last updated from hans lap
</commit_message>
<xml_diff>
--- a/Resources/MA Proposal Reyes v2.pptx
+++ b/Resources/MA Proposal Reyes v2.pptx
@@ -144,11 +144,11 @@
             <p14:sldId id="263"/>
             <p14:sldId id="269"/>
             <p14:sldId id="268"/>
-            <p14:sldId id="261"/>
           </p14:sldIdLst>
         </p14:section>
-        <p14:section name="Untitled Section" id="{F3AB6378-B591-4AA7-9ED5-42A962D5E3E0}">
+        <p14:section name="Update" id="{F3AB6378-B591-4AA7-9ED5-42A962D5E3E0}">
           <p14:sldIdLst>
+            <p14:sldId id="261"/>
             <p14:sldId id="272"/>
             <p14:sldId id="271"/>
             <p14:sldId id="274"/>
@@ -174,10 +174,45 @@
       </p:ext>
     </p:extLst>
   </p:cmAuthor>
+  <p:cmAuthor id="2" name="Carlos Reyes" initials="CR [2]" lastIdx="2" clrIdx="1">
+    <p:extLst>
+      <p:ext uri="{19B8F6BF-5375-455C-9EA6-DF929625EA0E}">
+        <p15:presenceInfo xmlns:p15="http://schemas.microsoft.com/office/powerpoint/2012/main" userId="S::carlos.reyes@hansrobot.de::9ff7e821-6406-4270-b42c-1ba105b6dfe2" providerId="AD"/>
+      </p:ext>
+    </p:extLst>
+  </p:cmAuthor>
 </p:cmAuthorLst>
 </file>
 
 <file path=ppt/comments/comment1.xml><?xml version="1.0" encoding="utf-8"?>
+<p:cmLst xmlns:a="http://schemas.openxmlformats.org/drawingml/2006/main" xmlns:r="http://schemas.openxmlformats.org/officeDocument/2006/relationships" xmlns:p="http://schemas.openxmlformats.org/presentationml/2006/main">
+  <p:cm authorId="2" dt="2021-01-15T10:27:35.921" idx="1">
+    <p:pos x="6172" y="1585"/>
+    <p:text>Add the command handler</p:text>
+    <p:extLst>
+      <p:ext uri="{C676402C-5697-4E1C-873F-D02D1690AC5C}">
+        <p15:threadingInfo xmlns:p15="http://schemas.microsoft.com/office/powerpoint/2012/main" timeZoneBias="-60"/>
+      </p:ext>
+    </p:extLst>
+  </p:cm>
+</p:cmLst>
+</file>
+
+<file path=ppt/comments/comment2.xml><?xml version="1.0" encoding="utf-8"?>
+<p:cmLst xmlns:a="http://schemas.openxmlformats.org/drawingml/2006/main" xmlns:r="http://schemas.openxmlformats.org/officeDocument/2006/relationships" xmlns:p="http://schemas.openxmlformats.org/presentationml/2006/main">
+  <p:cm authorId="2" dt="2021-01-15T10:29:48.491" idx="2">
+    <p:pos x="6237" y="1543"/>
+    <p:text>Add the command handler</p:text>
+    <p:extLst>
+      <p:ext uri="{C676402C-5697-4E1C-873F-D02D1690AC5C}">
+        <p15:threadingInfo xmlns:p15="http://schemas.microsoft.com/office/powerpoint/2012/main" timeZoneBias="-60"/>
+      </p:ext>
+    </p:extLst>
+  </p:cm>
+</p:cmLst>
+</file>
+
+<file path=ppt/comments/comment3.xml><?xml version="1.0" encoding="utf-8"?>
 <p:cmLst xmlns:a="http://schemas.openxmlformats.org/drawingml/2006/main" xmlns:r="http://schemas.openxmlformats.org/officeDocument/2006/relationships" xmlns:p="http://schemas.openxmlformats.org/presentationml/2006/main">
   <p:cm authorId="1" dt="2021-01-14T21:19:41.637" idx="1">
     <p:pos x="4520" y="1722"/>
@@ -4445,7 +4480,7 @@
           <a:p>
             <a:r>
               <a:rPr lang="en-US" sz="4800" dirty="0"/>
-              <a:t>Topic proposal (Draft)</a:t>
+              <a:t>Topic proposal</a:t>
             </a:r>
           </a:p>
         </p:txBody>
@@ -4473,8 +4508,12 @@
               <a:rPr lang="en-US" dirty="0"/>
             </a:br>
             <a:r>
+              <a:rPr lang="en-US" sz="2400" dirty="0"/>
+              <a:t>Draft rev. 2, </a:t>
+            </a:r>
+            <a:r>
               <a:rPr lang="en-US" dirty="0"/>
-              <a:t>2021.01.10</a:t>
+              <a:t>2021.01.15</a:t>
             </a:r>
           </a:p>
         </p:txBody>
@@ -4688,7 +4727,7 @@
             <a:pPr fontAlgn="base"/>
             <a:r>
               <a:rPr lang="en-US" dirty="0"/>
-              <a:t>Embedded systems are not directly visible to the end user. However, they must be extremely reliable to guarantee correct behavior of larger technical systems. For this reason elaborated test procedures are applied that successively validate each embedded system before shipping. </a:t>
+              <a:t>Embedded systems are not directly visible to the end user. However, they must be extremely reliable to guarantee correct behavior of larger technical systems. For this reason, elaborated test procedures are applied that successively validate each embedded system before shipping. </a:t>
             </a:r>
             <a:r>
               <a:rPr lang="en-US" b="1" dirty="0"/>
@@ -5230,7 +5269,7 @@
             </a:r>
             <a:r>
               <a:rPr lang="en-US" i="1" dirty="0"/>
-              <a:t> on a Axis Communication Hub to evaluate its performance and usage reliability within an </a:t>
+              <a:t> on an Axis Communication Hub to evaluate its performance and usage reliability within an </a:t>
             </a:r>
             <a:r>
               <a:rPr lang="en-US" i="1" dirty="0" err="1"/>
@@ -5286,7 +5325,7 @@
             <a:pPr lvl="1"/>
             <a:r>
               <a:rPr lang="en-US" dirty="0"/>
-              <a:t>Current Axis Communication Hub integrates a STM32F446RTE MCU with ARM Cortex-M4 architecture, has FPU and it is within the high performance family ST processors. 512kB Flash/128+4KB RAM[2].</a:t>
+              <a:t>Current Axis Communication Hub integrates a STM32F446RTE MCU with ARM Cortex-M4 architecture, has FPU and it is within the high-performance family ST processors. 512kB Flash/128+4KB RAM[2].</a:t>
             </a:r>
             <a:br>
               <a:rPr lang="en-US" dirty="0"/>
@@ -5361,9 +5400,16 @@
             <p:ph type="title"/>
           </p:nvPr>
         </p:nvSpPr>
-        <p:spPr/>
-        <p:txBody>
-          <a:bodyPr/>
+        <p:spPr>
+          <a:xfrm>
+            <a:off x="1097280" y="286604"/>
+            <a:ext cx="10058400" cy="702302"/>
+          </a:xfrm>
+        </p:spPr>
+        <p:txBody>
+          <a:bodyPr>
+            <a:normAutofit fontScale="90000"/>
+          </a:bodyPr>
           <a:lstStyle/>
           <a:p>
             <a:r>
@@ -5383,15 +5429,41 @@
             <p:ph idx="1"/>
           </p:nvPr>
         </p:nvSpPr>
-        <p:spPr/>
+        <p:spPr>
+          <a:xfrm>
+            <a:off x="1097280" y="988906"/>
+            <a:ext cx="10058400" cy="4023360"/>
+          </a:xfrm>
+        </p:spPr>
         <p:txBody>
           <a:bodyPr/>
           <a:lstStyle/>
           <a:p>
             <a:r>
               <a:rPr lang="en-US" dirty="0"/>
-              <a:t>Neural Network Kernel functions structure</a:t>
-            </a:r>
+              <a:t>CMSIS-NN: Efficient Neural Network Kernels for Arm Cortex-M CPUs[3]</a:t>
+            </a:r>
+          </a:p>
+          <a:p>
+            <a:pPr marL="0" indent="0">
+              <a:buNone/>
+            </a:pPr>
+            <a:endParaRPr lang="en-US" dirty="0"/>
+          </a:p>
+          <a:p>
+            <a:r>
+              <a:rPr lang="en-US" dirty="0"/>
+              <a:t>Neural Network Kernel functions structure:</a:t>
+            </a:r>
+          </a:p>
+          <a:p>
+            <a:r>
+              <a:rPr lang="en-US" dirty="0"/>
+              <a:t>(Still analyzing) </a:t>
+            </a:r>
+          </a:p>
+          <a:p>
+            <a:endParaRPr lang="en-US" dirty="0"/>
           </a:p>
           <a:p>
             <a:endParaRPr lang="en-US" dirty="0"/>
@@ -5437,7 +5509,7 @@
         </p:blipFill>
         <p:spPr>
           <a:xfrm>
-            <a:off x="3267075" y="2233612"/>
+            <a:off x="3392204" y="3225014"/>
             <a:ext cx="5657850" cy="2390775"/>
           </a:xfrm>
           <a:prstGeom prst="rect">
@@ -5731,9 +5803,6 @@
             </a:r>
           </a:p>
           <a:p>
-            <a:endParaRPr lang="es-ES" dirty="0"/>
-          </a:p>
-          <a:p>
             <a:r>
               <a:rPr lang="es-ES" dirty="0"/>
               <a:t>[2]	J. C. Reyes, “</a:t>
@@ -5841,6 +5910,108 @@
             <a:r>
               <a:rPr lang="es-ES" dirty="0"/>
               <a:t> (TUHH)</a:t>
+            </a:r>
+          </a:p>
+          <a:p>
+            <a:r>
+              <a:rPr lang="es-ES" dirty="0"/>
+              <a:t>[3]	</a:t>
+            </a:r>
+            <a:r>
+              <a:rPr lang="es-ES" dirty="0" err="1"/>
+              <a:t>Lai</a:t>
+            </a:r>
+            <a:r>
+              <a:rPr lang="es-ES" dirty="0"/>
+              <a:t> L, Suda N, </a:t>
+            </a:r>
+            <a:r>
+              <a:rPr lang="es-ES" dirty="0" err="1"/>
+              <a:t>Chandra</a:t>
+            </a:r>
+            <a:r>
+              <a:rPr lang="es-ES" dirty="0"/>
+              <a:t> V. “</a:t>
+            </a:r>
+            <a:r>
+              <a:rPr lang="es-ES" dirty="0" err="1"/>
+              <a:t>Cmsis-nn</a:t>
+            </a:r>
+            <a:r>
+              <a:rPr lang="es-ES" dirty="0"/>
+              <a:t>: </a:t>
+            </a:r>
+            <a:r>
+              <a:rPr lang="es-ES" dirty="0" err="1"/>
+              <a:t>Efficient</a:t>
+            </a:r>
+            <a:r>
+              <a:rPr lang="es-ES" dirty="0"/>
+              <a:t> neural </a:t>
+            </a:r>
+            <a:r>
+              <a:rPr lang="es-ES" dirty="0" err="1"/>
+              <a:t>network</a:t>
+            </a:r>
+            <a:r>
+              <a:rPr lang="es-ES" dirty="0"/>
+              <a:t> </a:t>
+            </a:r>
+            <a:r>
+              <a:rPr lang="es-ES" dirty="0" err="1"/>
+              <a:t>kernels</a:t>
+            </a:r>
+            <a:r>
+              <a:rPr lang="es-ES" dirty="0"/>
+              <a:t> </a:t>
+            </a:r>
+            <a:r>
+              <a:rPr lang="es-ES" dirty="0" err="1"/>
+              <a:t>for</a:t>
+            </a:r>
+            <a:r>
+              <a:rPr lang="es-ES" dirty="0"/>
+              <a:t> </a:t>
+            </a:r>
+            <a:r>
+              <a:rPr lang="es-ES" dirty="0" err="1"/>
+              <a:t>arm</a:t>
+            </a:r>
+            <a:r>
+              <a:rPr lang="es-ES" dirty="0"/>
+              <a:t> </a:t>
+            </a:r>
+            <a:r>
+              <a:rPr lang="es-ES" dirty="0" err="1"/>
+              <a:t>cortex</a:t>
+            </a:r>
+            <a:r>
+              <a:rPr lang="es-ES" dirty="0"/>
+              <a:t>-m </a:t>
+            </a:r>
+            <a:r>
+              <a:rPr lang="es-ES" dirty="0" err="1"/>
+              <a:t>cpus</a:t>
+            </a:r>
+            <a:r>
+              <a:rPr lang="es-ES" dirty="0"/>
+              <a:t>.” </a:t>
+            </a:r>
+            <a:r>
+              <a:rPr lang="es-ES" dirty="0" err="1"/>
+              <a:t>arXiv</a:t>
+            </a:r>
+            <a:r>
+              <a:rPr lang="es-ES" dirty="0"/>
+              <a:t> </a:t>
+            </a:r>
+            <a:r>
+              <a:rPr lang="es-ES" dirty="0" err="1"/>
+              <a:t>preprint</a:t>
+            </a:r>
+            <a:r>
+              <a:rPr lang="es-ES" dirty="0"/>
+              <a:t> arXiv:1801.06601. 2018 Jan 19.</a:t>
             </a:r>
           </a:p>
         </p:txBody>
@@ -5921,7 +6092,9 @@
           </a:xfrm>
         </p:spPr>
         <p:txBody>
-          <a:bodyPr/>
+          <a:bodyPr>
+            <a:normAutofit fontScale="90000"/>
+          </a:bodyPr>
           <a:lstStyle/>
           <a:p>
             <a:r>
@@ -5949,7 +6122,7 @@
         </p:blipFill>
         <p:spPr>
           <a:xfrm>
-            <a:off x="2990335" y="836317"/>
+            <a:off x="2922959" y="836317"/>
             <a:ext cx="5000367" cy="5484778"/>
           </a:xfrm>
           <a:prstGeom prst="rect">
@@ -6130,7 +6303,7 @@
           <a:p>
             <a:r>
               <a:rPr lang="en-US" dirty="0"/>
-              <a:t>Axis communication hub</a:t>
+              <a:t>Axis communication hub’s current structure</a:t>
             </a:r>
           </a:p>
         </p:txBody>
@@ -6147,7 +6320,7 @@
         </p:nvSpPr>
         <p:spPr>
           <a:xfrm>
-            <a:off x="1097280" y="1079157"/>
+            <a:off x="1066800" y="1185035"/>
             <a:ext cx="10058400" cy="4789937"/>
           </a:xfrm>
         </p:spPr>
@@ -6155,15 +6328,25 @@
           <a:bodyPr/>
           <a:lstStyle/>
           <a:p>
+            <a:pPr lvl="1"/>
             <a:r>
               <a:rPr lang="en-US" dirty="0"/>
-              <a:t>Current structure, highlighting network related tasks, event handler and peripheral control-related tasks.</a:t>
-            </a:r>
-          </a:p>
-          <a:p>
+              <a:t>Highlights: network related tasks, event and command handler and peripheral control-related tasks. The board works within an </a:t>
+            </a:r>
+            <a:r>
+              <a:rPr lang="en-US" dirty="0" err="1"/>
+              <a:t>EtherCAT</a:t>
+            </a:r>
             <a:r>
               <a:rPr lang="en-US" dirty="0"/>
-              <a:t>State machines that are verifiable through software, e.g., UPPAL. Verification software for FSMs</a:t>
+              <a:t> control network in a 6-Axis Robot.</a:t>
+            </a:r>
+          </a:p>
+          <a:p>
+            <a:pPr lvl="1"/>
+            <a:r>
+              <a:rPr lang="en-US" dirty="0"/>
+              <a:t>State machines structured such that they could be verifiable through software, e.g., UPPA (Verification software for FSMs)</a:t>
             </a:r>
           </a:p>
         </p:txBody>
@@ -6190,8 +6373,8 @@
         </p:blipFill>
         <p:spPr>
           <a:xfrm>
-            <a:off x="1724215" y="2222372"/>
-            <a:ext cx="8144715" cy="4040088"/>
+            <a:off x="2059775" y="2516115"/>
+            <a:ext cx="7738567" cy="3838623"/>
           </a:xfrm>
           <a:prstGeom prst="rect">
             <a:avLst/>
@@ -6281,7 +6464,7 @@
           <a:p>
             <a:r>
               <a:rPr lang="en-US" sz="4000" dirty="0"/>
-              <a:t>Current structure with new feature</a:t>
+              <a:t>New feature within the structure</a:t>
             </a:r>
           </a:p>
         </p:txBody>
@@ -6298,7 +6481,7 @@
         </p:nvSpPr>
         <p:spPr>
           <a:xfrm>
-            <a:off x="1097280" y="1021492"/>
+            <a:off x="1066800" y="1175497"/>
             <a:ext cx="10058400" cy="4847602"/>
           </a:xfrm>
         </p:spPr>
@@ -6306,15 +6489,17 @@
           <a:bodyPr/>
           <a:lstStyle/>
           <a:p>
+            <a:pPr lvl="1"/>
             <a:r>
               <a:rPr lang="en-US" dirty="0"/>
               <a:t>Proposed structure with highlighted Neuronal Network running as a task. Other tasks merged only for space reasons.</a:t>
             </a:r>
           </a:p>
           <a:p>
+            <a:pPr lvl="1"/>
             <a:r>
               <a:rPr lang="en-US" dirty="0"/>
-              <a:t>Highlighted block can be adapted to any functionality. Nonetheless, a NN is commonly created out of higher-level tools.</a:t>
+              <a:t>Highlighted block can be adapted to any functionality. The NN is commonly created out of higher-level tools and would be adapted to current architecture.</a:t>
             </a:r>
             <a:endParaRPr lang="es-ES" dirty="0"/>
           </a:p>
@@ -6451,15 +6636,17 @@
           <a:bodyPr/>
           <a:lstStyle/>
           <a:p>
+            <a:pPr lvl="1"/>
             <a:r>
               <a:rPr lang="en-US" dirty="0"/>
-              <a:t>Proposal assumes a given and high reliability of the sensor and industrial controller.</a:t>
-            </a:r>
-          </a:p>
-          <a:p>
+              <a:t>The proposal assumes high reliability in both the given sensor and the industrial controller.</a:t>
+            </a:r>
+          </a:p>
+          <a:p>
+            <a:pPr lvl="1"/>
             <a:r>
               <a:rPr lang="en-US" dirty="0"/>
-              <a:t>Whereas the communication hub’s reliability depends on the right execution of its internal features to not affect the “reliability chain”.</a:t>
+              <a:t>Whereas the communication hub’s reliability depends on the right execution of its internal features to not affect this reliability chain.</a:t>
             </a:r>
           </a:p>
         </p:txBody>
@@ -6610,7 +6797,7 @@
           <a:p>
             <a:r>
               <a:rPr lang="en-US" dirty="0"/>
-              <a:t>Proposed the Network-related tasks and the NN-related tasks.</a:t>
+              <a:t>Proposal: the Network-related tasks and the NN-related tasks could be verified separately. Prioritization to one of them would be the focus of the Project.</a:t>
             </a:r>
           </a:p>
         </p:txBody>
@@ -6623,16 +6810,15 @@
           </p:cNvPicPr>
           <p:nvPr/>
         </p:nvPicPr>
-        <p:blipFill>
+        <p:blipFill rotWithShape="1">
           <a:blip r:embed="rId2"/>
-          <a:stretch>
-            <a:fillRect/>
-          </a:stretch>
+          <a:srcRect b="11135"/>
+          <a:stretch/>
         </p:blipFill>
         <p:spPr>
           <a:xfrm>
-            <a:off x="2858530" y="2487359"/>
-            <a:ext cx="6200903" cy="3566037"/>
+            <a:off x="2800778" y="2995484"/>
+            <a:ext cx="6200903" cy="3168956"/>
           </a:xfrm>
           <a:prstGeom prst="rect">
             <a:avLst/>
@@ -6755,7 +6941,7 @@
           <a:p>
             <a:r>
               <a:rPr lang="en-US" dirty="0"/>
-              <a:t>Set of tools according to the nature of what is going to be validated or verify and the level of formality.</a:t>
+              <a:t>The following is a set of tools to consider according to the nature of what is going to be validated or verified and the level of formality.</a:t>
             </a:r>
           </a:p>
         </p:txBody>
@@ -6776,7 +6962,7 @@
         </p:blipFill>
         <p:spPr>
           <a:xfrm>
-            <a:off x="2338817" y="2249401"/>
+            <a:off x="2358068" y="2345654"/>
             <a:ext cx="7077075" cy="3914775"/>
           </a:xfrm>
           <a:prstGeom prst="rect">
@@ -6882,19 +7068,39 @@
           <a:p>
             <a:r>
               <a:rPr lang="en-US" dirty="0"/>
-              <a:t>Rely on 3 topics</a:t>
-            </a:r>
-          </a:p>
-          <a:p>
+              <a:t>All of them rely on 3 main topics</a:t>
+            </a:r>
+          </a:p>
+          <a:p>
+            <a:r>
+              <a:rPr lang="en-US" dirty="0">
+                <a:solidFill>
+                  <a:srgbClr val="00B050"/>
+                </a:solidFill>
+              </a:rPr>
+              <a:t>Software for embedded systems</a:t>
+            </a:r>
             <a:r>
               <a:rPr lang="en-US" dirty="0"/>
-              <a:t>Software for embedded systems, software verification and machine learning.</a:t>
-            </a:r>
-          </a:p>
-          <a:p>
+              <a:t>, software verification and </a:t>
+            </a:r>
+            <a:r>
+              <a:rPr lang="en-US" dirty="0">
+                <a:solidFill>
+                  <a:srgbClr val="FFC000"/>
+                </a:solidFill>
+              </a:rPr>
+              <a:t>machine learning</a:t>
+            </a:r>
             <a:r>
               <a:rPr lang="en-US" dirty="0"/>
-              <a:t>Levels of formality within proposals:</a:t>
+              <a:t>.</a:t>
+            </a:r>
+          </a:p>
+          <a:p>
+            <a:r>
+              <a:rPr lang="en-US" dirty="0"/>
+              <a:t>Possible topics for project depending on the approach and formality of the verification:</a:t>
             </a:r>
           </a:p>
           <a:p>
@@ -6914,7 +7120,7 @@
             </a:pPr>
             <a:r>
               <a:rPr lang="en-US" dirty="0"/>
-              <a:t>Verification of FSMs in embedded systems (Network tasks + P-NN as “black box”)</a:t>
+              <a:t>Verification of FSMs in embedded systems (Network tasks + P-NN as quasi “black box”)</a:t>
             </a:r>
           </a:p>
           <a:p>
@@ -6924,7 +7130,7 @@
             </a:pPr>
             <a:r>
               <a:rPr lang="en-US" dirty="0"/>
-              <a:t>Documentation of dependability analysis according to IEC standards (hardware and less software oriented)</a:t>
+              <a:t>Documentation of dependability analysis according to IEC/IEEE standards (hardware and less software oriented)</a:t>
             </a:r>
           </a:p>
           <a:p>
@@ -7008,7 +7214,7 @@
           <a:p>
             <a:r>
               <a:rPr lang="en-US" dirty="0"/>
-              <a:t>Flexibility</a:t>
+              <a:t>Flexibility of the current structure</a:t>
             </a:r>
           </a:p>
         </p:txBody>
@@ -7028,7 +7234,10 @@
           <a:bodyPr/>
           <a:lstStyle/>
           <a:p>
-            <a:endParaRPr lang="en-US"/>
+            <a:r>
+              <a:rPr lang="en-US" dirty="0"/>
+              <a:t>Highlighted the tools used during the development of the Axis Communication Hub (Architecture and Operating System)</a:t>
+            </a:r>
           </a:p>
         </p:txBody>
       </p:sp>
@@ -7048,7 +7257,7 @@
         </p:blipFill>
         <p:spPr>
           <a:xfrm>
-            <a:off x="2672664" y="2092411"/>
+            <a:off x="2634163" y="2564049"/>
             <a:ext cx="6701816" cy="3687462"/>
           </a:xfrm>
           <a:prstGeom prst="rect">

</xml_diff>